<commit_message>
add Roberto's email to final slide
</commit_message>
<xml_diff>
--- a/erdos-music_project.pptx
+++ b/erdos-music_project.pptx
@@ -768,14 +768,14 @@
           </a:ln>
           <a:extLst>
             <a:ext uri="{909E8E84-426E-40dd-AFC4-6F175D3DCCD1}">
-              <a14:hiddenFill xmlns:a14="http://schemas.microsoft.com/office/drawing/2010/main" xmlns="">
+              <a14:hiddenFill xmlns="" xmlns:a14="http://schemas.microsoft.com/office/drawing/2010/main">
                 <a:solidFill>
                   <a:srgbClr val="FFFFFF"/>
                 </a:solidFill>
               </a14:hiddenFill>
             </a:ext>
             <a:ext uri="{91240B29-F687-4f45-9708-019B960494DF}">
-              <a14:hiddenLine xmlns:a14="http://schemas.microsoft.com/office/drawing/2010/main" xmlns="" w="9525">
+              <a14:hiddenLine xmlns="" xmlns:a14="http://schemas.microsoft.com/office/drawing/2010/main" w="9525">
                 <a:solidFill>
                   <a:srgbClr val="000000"/>
                 </a:solidFill>
@@ -3550,11 +3550,7 @@
           <a:p>
             <a:r>
               <a:rPr lang="en-US" dirty="0" smtClean="0"/>
-              <a:t>Metal or </a:t>
-            </a:r>
-            <a:r>
-              <a:rPr lang="en-US" dirty="0" smtClean="0"/>
-              <a:t>Not?</a:t>
+              <a:t>Metal or Not?</a:t>
             </a:r>
             <a:endParaRPr lang="en-US" dirty="0"/>
           </a:p>
@@ -3590,13 +3586,8 @@
           <a:p>
             <a:r>
               <a:rPr lang="en-US" sz="2200" i="1" dirty="0" smtClean="0"/>
-              <a:t>Building a model to classify if song lyrics are of the metal </a:t>
-            </a:r>
-            <a:r>
-              <a:rPr lang="en-US" sz="2200" i="1" dirty="0" smtClean="0"/>
-              <a:t>genre or not?</a:t>
-            </a:r>
-            <a:endParaRPr lang="en-US" sz="2200" i="1" dirty="0" smtClean="0"/>
+              <a:t>Building a model to classify if song lyrics are of the metal genre or not?</a:t>
+            </a:r>
           </a:p>
           <a:p>
             <a:r>
@@ -3732,11 +3723,7 @@
             <a:pPr algn="ctr"/>
             <a:r>
               <a:rPr lang="en-US" dirty="0" smtClean="0"/>
-              <a:t>The </a:t>
-            </a:r>
-            <a:r>
-              <a:rPr lang="en-US" dirty="0" smtClean="0"/>
-              <a:t>Question and Goal</a:t>
+              <a:t>The Question and Goal</a:t>
             </a:r>
             <a:endParaRPr lang="en-US" dirty="0"/>
           </a:p>
@@ -3772,7 +3759,6 @@
               <a:rPr lang="en-US" sz="2800" dirty="0" smtClean="0"/>
               <a:t>You may have noticed that lyrics of songs from different genres of music tend to focus on different topics. </a:t>
             </a:r>
-            <a:endParaRPr lang="en-US" sz="2800" dirty="0" smtClean="0"/>
           </a:p>
           <a:p>
             <a:pPr marL="285750" indent="-285750">
@@ -3790,7 +3776,6 @@
               <a:rPr lang="en-US" sz="2800" dirty="0" smtClean="0"/>
               <a:t> When you think of reggae music what common words come to mind? What about when you think of heavy metal?</a:t>
             </a:r>
-            <a:endParaRPr lang="en-US" sz="2800" dirty="0" smtClean="0"/>
           </a:p>
           <a:p>
             <a:pPr marL="285750" indent="-285750">
@@ -3808,7 +3793,6 @@
               <a:rPr lang="en-US" sz="2800" dirty="0" smtClean="0"/>
               <a:t> Create a classifier to distinguish song lyrics by genre.</a:t>
             </a:r>
-            <a:endParaRPr lang="en-US" sz="2800" dirty="0" smtClean="0"/>
           </a:p>
           <a:p>
             <a:pPr marL="285750" indent="-285750">
@@ -3982,13 +3966,7 @@
               <a:rPr lang="en-US" dirty="0" smtClean="0">
                 <a:hlinkClick r:id="rId4"/>
               </a:rPr>
-              <a:t>http://www.azlyrics.com</a:t>
-            </a:r>
-            <a:r>
-              <a:rPr lang="en-US" dirty="0" smtClean="0">
-                <a:hlinkClick r:id="rId4"/>
-              </a:rPr>
-              <a:t>)</a:t>
+              <a:t>http://www.azlyrics.com)</a:t>
             </a:r>
             <a:endParaRPr lang="en-US" dirty="0" smtClean="0"/>
           </a:p>
@@ -4358,8 +4336,14 @@
               <a:t>eileen.blum@rutgers.edu</a:t>
             </a:r>
             <a:r>
-              <a:rPr lang="en-US" smtClean="0"/>
+              <a:rPr lang="en-US" dirty="0" smtClean="0"/>
               <a:t>		</a:t>
+            </a:r>
+            <a:r>
+              <a:rPr lang="en-US" u="sng" dirty="0">
+                <a:hlinkClick r:id="rId4"/>
+              </a:rPr>
+              <a:t>hernandezpalomares.1@osu.edu</a:t>
             </a:r>
             <a:endParaRPr lang="en-US" dirty="0" smtClean="0"/>
           </a:p>

</xml_diff>

<commit_message>
update dtclassifier, add knn
</commit_message>
<xml_diff>
--- a/erdos-music_project.pptx
+++ b/erdos-music_project.pptx
@@ -5,15 +5,17 @@
     <p:sldMasterId id="2147483672" r:id="rId1"/>
   </p:sldMasterIdLst>
   <p:notesMasterIdLst>
-    <p:notesMasterId r:id="rId8"/>
+    <p:notesMasterId r:id="rId10"/>
   </p:notesMasterIdLst>
   <p:sldIdLst>
     <p:sldId id="256" r:id="rId2"/>
     <p:sldId id="257" r:id="rId3"/>
     <p:sldId id="258" r:id="rId4"/>
     <p:sldId id="259" r:id="rId5"/>
-    <p:sldId id="260" r:id="rId6"/>
-    <p:sldId id="261" r:id="rId7"/>
+    <p:sldId id="262" r:id="rId6"/>
+    <p:sldId id="263" r:id="rId7"/>
+    <p:sldId id="260" r:id="rId8"/>
+    <p:sldId id="261" r:id="rId9"/>
   </p:sldIdLst>
   <p:sldSz cx="12192000" cy="6858000"/>
   <p:notesSz cx="6858000" cy="9144000"/>
@@ -535,7 +537,7 @@
           <a:p>
             <a:fld id="{41A8A208-B538-A443-8AF9-C74EC34A4FD4}" type="slidenum">
               <a:rPr lang="en-US" smtClean="0"/>
-              <a:t>5</a:t>
+              <a:t>7</a:t>
             </a:fld>
             <a:endParaRPr lang="en-US"/>
           </a:p>
@@ -4115,6 +4117,11 @@
               <a:rPr lang="en-US" dirty="0"/>
               <a:t>We achieved % lyric classification accuracy by using </a:t>
             </a:r>
+            <a:r>
+              <a:rPr lang="en-US" dirty="0" smtClean="0"/>
+              <a:t>a Decision Tree Classifier</a:t>
+            </a:r>
+            <a:endParaRPr lang="en-US" dirty="0"/>
           </a:p>
           <a:p>
             <a:endParaRPr lang="en-US" dirty="0"/>
@@ -4161,6 +4168,229 @@
             <p:ph type="title"/>
           </p:nvPr>
         </p:nvSpPr>
+        <p:spPr>
+          <a:xfrm>
+            <a:off x="466332" y="118309"/>
+            <a:ext cx="4879443" cy="1217354"/>
+          </a:xfrm>
+        </p:spPr>
+        <p:txBody>
+          <a:bodyPr>
+            <a:normAutofit/>
+          </a:bodyPr>
+          <a:lstStyle/>
+          <a:p>
+            <a:r>
+              <a:rPr lang="en-US" sz="2800" smtClean="0"/>
+              <a:t>Data Frame Input to Word2Vec</a:t>
+            </a:r>
+            <a:endParaRPr lang="en-US" sz="2800" dirty="0"/>
+          </a:p>
+        </p:txBody>
+      </p:sp>
+      <p:pic>
+        <p:nvPicPr>
+          <p:cNvPr id="5" name="Picture 4"/>
+          <p:cNvPicPr>
+            <a:picLocks noChangeAspect="1"/>
+          </p:cNvPicPr>
+          <p:nvPr/>
+        </p:nvPicPr>
+        <p:blipFill>
+          <a:blip r:embed="rId2">
+            <a:extLst>
+              <a:ext uri="{28A0092B-C50C-407E-A947-70E740481C1C}">
+                <a14:useLocalDpi xmlns:a14="http://schemas.microsoft.com/office/drawing/2010/main" val="0"/>
+              </a:ext>
+            </a:extLst>
+          </a:blip>
+          <a:stretch>
+            <a:fillRect/>
+          </a:stretch>
+        </p:blipFill>
+        <p:spPr>
+          <a:xfrm>
+            <a:off x="6517322" y="1309156"/>
+            <a:ext cx="5162978" cy="5454028"/>
+          </a:xfrm>
+          <a:prstGeom prst="rect">
+            <a:avLst/>
+          </a:prstGeom>
+        </p:spPr>
+      </p:pic>
+      <p:pic>
+        <p:nvPicPr>
+          <p:cNvPr id="6" name="Picture 5"/>
+          <p:cNvPicPr>
+            <a:picLocks noChangeAspect="1"/>
+          </p:cNvPicPr>
+          <p:nvPr/>
+        </p:nvPicPr>
+        <p:blipFill>
+          <a:blip r:embed="rId3">
+            <a:extLst>
+              <a:ext uri="{28A0092B-C50C-407E-A947-70E740481C1C}">
+                <a14:useLocalDpi xmlns:a14="http://schemas.microsoft.com/office/drawing/2010/main" val="0"/>
+              </a:ext>
+            </a:extLst>
+          </a:blip>
+          <a:stretch>
+            <a:fillRect/>
+          </a:stretch>
+        </p:blipFill>
+        <p:spPr>
+          <a:xfrm>
+            <a:off x="1041988" y="1335663"/>
+            <a:ext cx="3728129" cy="5548843"/>
+          </a:xfrm>
+          <a:prstGeom prst="rect">
+            <a:avLst/>
+          </a:prstGeom>
+        </p:spPr>
+      </p:pic>
+      <p:sp>
+        <p:nvSpPr>
+          <p:cNvPr id="8" name="Title 1"/>
+          <p:cNvSpPr txBox="1">
+            <a:spLocks/>
+          </p:cNvSpPr>
+          <p:nvPr/>
+        </p:nvSpPr>
+        <p:spPr>
+          <a:xfrm>
+            <a:off x="6115493" y="168002"/>
+            <a:ext cx="5966637" cy="1293554"/>
+          </a:xfrm>
+          <a:prstGeom prst="rect">
+            <a:avLst/>
+          </a:prstGeom>
+        </p:spPr>
+        <p:txBody>
+          <a:bodyPr vert="horz" lIns="91440" tIns="45720" rIns="91440" bIns="45720" rtlCol="0" anchor="ctr">
+            <a:normAutofit/>
+          </a:bodyPr>
+          <a:lstStyle>
+            <a:lvl1pPr algn="l" defTabSz="914400" rtl="0" eaLnBrk="1" latinLnBrk="0" hangingPunct="1">
+              <a:lnSpc>
+                <a:spcPct val="90000"/>
+              </a:lnSpc>
+              <a:spcBef>
+                <a:spcPct val="0"/>
+              </a:spcBef>
+              <a:buNone/>
+              <a:defRPr sz="4400" kern="1200">
+                <a:solidFill>
+                  <a:schemeClr val="tx1"/>
+                </a:solidFill>
+                <a:latin typeface="+mj-lt"/>
+                <a:ea typeface="+mj-ea"/>
+                <a:cs typeface="+mj-cs"/>
+              </a:defRPr>
+            </a:lvl1pPr>
+          </a:lstStyle>
+          <a:p>
+            <a:r>
+              <a:rPr lang="en-US" sz="2800" smtClean="0"/>
+              <a:t>K-Means Clustering of words with PCA</a:t>
+            </a:r>
+            <a:endParaRPr lang="en-US" sz="2800" dirty="0"/>
+          </a:p>
+        </p:txBody>
+      </p:sp>
+    </p:spTree>
+    <p:extLst>
+      <p:ext uri="{BB962C8B-B14F-4D97-AF65-F5344CB8AC3E}">
+        <p14:creationId xmlns:p14="http://schemas.microsoft.com/office/powerpoint/2010/main" val="1860784889"/>
+      </p:ext>
+    </p:extLst>
+  </p:cSld>
+  <p:clrMapOvr>
+    <a:masterClrMapping/>
+  </p:clrMapOvr>
+</p:sld>
+</file>
+
+<file path=ppt/slides/slide6.xml><?xml version="1.0" encoding="utf-8"?>
+<p:sld xmlns:a="http://schemas.openxmlformats.org/drawingml/2006/main" xmlns:r="http://schemas.openxmlformats.org/officeDocument/2006/relationships" xmlns:p="http://schemas.openxmlformats.org/presentationml/2006/main">
+  <p:cSld>
+    <p:spTree>
+      <p:nvGrpSpPr>
+        <p:cNvPr id="1" name=""/>
+        <p:cNvGrpSpPr/>
+        <p:nvPr/>
+      </p:nvGrpSpPr>
+      <p:grpSpPr>
+        <a:xfrm>
+          <a:off x="0" y="0"/>
+          <a:ext cx="0" cy="0"/>
+          <a:chOff x="0" y="0"/>
+          <a:chExt cx="0" cy="0"/>
+        </a:xfrm>
+      </p:grpSpPr>
+      <p:sp>
+        <p:nvSpPr>
+          <p:cNvPr id="2" name="Title 1"/>
+          <p:cNvSpPr>
+            <a:spLocks noGrp="1"/>
+          </p:cNvSpPr>
+          <p:nvPr>
+            <p:ph type="title"/>
+          </p:nvPr>
+        </p:nvSpPr>
+        <p:spPr/>
+        <p:txBody>
+          <a:bodyPr/>
+          <a:lstStyle/>
+          <a:p>
+            <a:pPr algn="ctr"/>
+            <a:r>
+              <a:rPr lang="en-US" dirty="0" smtClean="0"/>
+              <a:t>Decision Tree</a:t>
+            </a:r>
+            <a:endParaRPr lang="en-US" dirty="0"/>
+          </a:p>
+        </p:txBody>
+      </p:sp>
+    </p:spTree>
+    <p:extLst>
+      <p:ext uri="{BB962C8B-B14F-4D97-AF65-F5344CB8AC3E}">
+        <p14:creationId xmlns:p14="http://schemas.microsoft.com/office/powerpoint/2010/main" val="1362897135"/>
+      </p:ext>
+    </p:extLst>
+  </p:cSld>
+  <p:clrMapOvr>
+    <a:masterClrMapping/>
+  </p:clrMapOvr>
+</p:sld>
+</file>
+
+<file path=ppt/slides/slide7.xml><?xml version="1.0" encoding="utf-8"?>
+<p:sld xmlns:a="http://schemas.openxmlformats.org/drawingml/2006/main" xmlns:r="http://schemas.openxmlformats.org/officeDocument/2006/relationships" xmlns:p="http://schemas.openxmlformats.org/presentationml/2006/main">
+  <p:cSld>
+    <p:spTree>
+      <p:nvGrpSpPr>
+        <p:cNvPr id="1" name=""/>
+        <p:cNvGrpSpPr/>
+        <p:nvPr/>
+      </p:nvGrpSpPr>
+      <p:grpSpPr>
+        <a:xfrm>
+          <a:off x="0" y="0"/>
+          <a:ext cx="0" cy="0"/>
+          <a:chOff x="0" y="0"/>
+          <a:chExt cx="0" cy="0"/>
+        </a:xfrm>
+      </p:grpSpPr>
+      <p:sp>
+        <p:nvSpPr>
+          <p:cNvPr id="2" name="Title 1"/>
+          <p:cNvSpPr>
+            <a:spLocks noGrp="1"/>
+          </p:cNvSpPr>
+          <p:nvPr>
+            <p:ph type="title"/>
+          </p:nvPr>
+        </p:nvSpPr>
         <p:spPr/>
         <p:txBody>
           <a:bodyPr/>
@@ -4229,7 +4459,7 @@
 </p:sld>
 </file>
 
-<file path=ppt/slides/slide6.xml><?xml version="1.0" encoding="utf-8"?>
+<file path=ppt/slides/slide8.xml><?xml version="1.0" encoding="utf-8"?>
 <p:sld xmlns:a="http://schemas.openxmlformats.org/drawingml/2006/main" xmlns:r="http://schemas.openxmlformats.org/officeDocument/2006/relationships" xmlns:p="http://schemas.openxmlformats.org/presentationml/2006/main">
   <p:cSld>
     <p:spTree>

</xml_diff>

<commit_message>
add k=100 plot, update classifier code, powerpoint
</commit_message>
<xml_diff>
--- a/erdos-music_project.pptx
+++ b/erdos-music_project.pptx
@@ -3582,8 +3582,17 @@
           <a:p>
             <a:r>
               <a:rPr lang="en-US" dirty="0" smtClean="0"/>
-              <a:t>Team 3: Eileen Blum and Roberto Hernandez</a:t>
-            </a:r>
+              <a:t>Team 3: Eileen Blum and </a:t>
+            </a:r>
+            <a:r>
+              <a:rPr lang="en-US" dirty="0"/>
+              <a:t>Roberto Hernández </a:t>
+            </a:r>
+            <a:r>
+              <a:rPr lang="en-US" dirty="0" err="1"/>
+              <a:t>Palomares</a:t>
+            </a:r>
+            <a:endParaRPr lang="en-US" dirty="0" smtClean="0"/>
           </a:p>
           <a:p>
             <a:r>
@@ -3995,7 +4004,15 @@
             </a:r>
             <a:r>
               <a:rPr lang="en-US" dirty="0"/>
-              <a:t>We trained a sentiment classification model using the </a:t>
+              <a:t>We trained a </a:t>
+            </a:r>
+            <a:r>
+              <a:rPr lang="en-US" dirty="0" smtClean="0"/>
+              <a:t>genre classification </a:t>
+            </a:r>
+            <a:r>
+              <a:rPr lang="en-US" dirty="0"/>
+              <a:t>model using the </a:t>
             </a:r>
             <a:r>
               <a:rPr lang="en-US" dirty="0" err="1" smtClean="0"/>
@@ -4190,7 +4207,7 @@
       </p:sp>
       <p:pic>
         <p:nvPicPr>
-          <p:cNvPr id="5" name="Picture 4"/>
+          <p:cNvPr id="6" name="Picture 5"/>
           <p:cNvPicPr>
             <a:picLocks noChangeAspect="1"/>
           </p:cNvPicPr>
@@ -4210,17 +4227,72 @@
         </p:blipFill>
         <p:spPr>
           <a:xfrm>
-            <a:off x="6517322" y="1309156"/>
-            <a:ext cx="5162978" cy="5454028"/>
+            <a:off x="838788" y="1349934"/>
+            <a:ext cx="3728129" cy="5548843"/>
           </a:xfrm>
           <a:prstGeom prst="rect">
             <a:avLst/>
           </a:prstGeom>
         </p:spPr>
       </p:pic>
+      <p:sp>
+        <p:nvSpPr>
+          <p:cNvPr id="8" name="Title 1"/>
+          <p:cNvSpPr txBox="1">
+            <a:spLocks/>
+          </p:cNvSpPr>
+          <p:nvPr/>
+        </p:nvSpPr>
+        <p:spPr>
+          <a:xfrm>
+            <a:off x="6115493" y="168002"/>
+            <a:ext cx="5966637" cy="1293554"/>
+          </a:xfrm>
+          <a:prstGeom prst="rect">
+            <a:avLst/>
+          </a:prstGeom>
+        </p:spPr>
+        <p:txBody>
+          <a:bodyPr vert="horz" lIns="91440" tIns="45720" rIns="91440" bIns="45720" rtlCol="0" anchor="ctr">
+            <a:normAutofit/>
+          </a:bodyPr>
+          <a:lstStyle>
+            <a:lvl1pPr algn="l" defTabSz="914400" rtl="0" eaLnBrk="1" latinLnBrk="0" hangingPunct="1">
+              <a:lnSpc>
+                <a:spcPct val="90000"/>
+              </a:lnSpc>
+              <a:spcBef>
+                <a:spcPct val="0"/>
+              </a:spcBef>
+              <a:buNone/>
+              <a:defRPr sz="4400" kern="1200">
+                <a:solidFill>
+                  <a:schemeClr val="tx1"/>
+                </a:solidFill>
+                <a:latin typeface="+mj-lt"/>
+                <a:ea typeface="+mj-ea"/>
+                <a:cs typeface="+mj-cs"/>
+              </a:defRPr>
+            </a:lvl1pPr>
+          </a:lstStyle>
+          <a:p>
+            <a:r>
+              <a:rPr lang="en-US" sz="2800" dirty="0" smtClean="0"/>
+              <a:t>K-Means Clustering of words with PCA</a:t>
+            </a:r>
+          </a:p>
+          <a:p>
+            <a:r>
+              <a:rPr lang="en-US" sz="2800" dirty="0" smtClean="0"/>
+              <a:t>k = 100 clusters</a:t>
+            </a:r>
+            <a:endParaRPr lang="en-US" sz="2800" dirty="0"/>
+          </a:p>
+        </p:txBody>
+      </p:sp>
       <p:pic>
         <p:nvPicPr>
-          <p:cNvPr id="6" name="Picture 5"/>
+          <p:cNvPr id="9" name="Picture 8"/>
           <p:cNvPicPr>
             <a:picLocks noChangeAspect="1"/>
           </p:cNvPicPr>
@@ -4240,63 +4312,14 @@
         </p:blipFill>
         <p:spPr>
           <a:xfrm>
-            <a:off x="1041988" y="1335663"/>
-            <a:ext cx="3728129" cy="5548843"/>
+            <a:off x="5336635" y="1335663"/>
+            <a:ext cx="6729339" cy="5520299"/>
           </a:xfrm>
           <a:prstGeom prst="rect">
             <a:avLst/>
           </a:prstGeom>
         </p:spPr>
       </p:pic>
-      <p:sp>
-        <p:nvSpPr>
-          <p:cNvPr id="8" name="Title 1"/>
-          <p:cNvSpPr txBox="1">
-            <a:spLocks/>
-          </p:cNvSpPr>
-          <p:nvPr/>
-        </p:nvSpPr>
-        <p:spPr>
-          <a:xfrm>
-            <a:off x="6115493" y="168002"/>
-            <a:ext cx="5966637" cy="1293554"/>
-          </a:xfrm>
-          <a:prstGeom prst="rect">
-            <a:avLst/>
-          </a:prstGeom>
-        </p:spPr>
-        <p:txBody>
-          <a:bodyPr vert="horz" lIns="91440" tIns="45720" rIns="91440" bIns="45720" rtlCol="0" anchor="ctr">
-            <a:normAutofit/>
-          </a:bodyPr>
-          <a:lstStyle>
-            <a:lvl1pPr algn="l" defTabSz="914400" rtl="0" eaLnBrk="1" latinLnBrk="0" hangingPunct="1">
-              <a:lnSpc>
-                <a:spcPct val="90000"/>
-              </a:lnSpc>
-              <a:spcBef>
-                <a:spcPct val="0"/>
-              </a:spcBef>
-              <a:buNone/>
-              <a:defRPr sz="4400" kern="1200">
-                <a:solidFill>
-                  <a:schemeClr val="tx1"/>
-                </a:solidFill>
-                <a:latin typeface="+mj-lt"/>
-                <a:ea typeface="+mj-ea"/>
-                <a:cs typeface="+mj-cs"/>
-              </a:defRPr>
-            </a:lvl1pPr>
-          </a:lstStyle>
-          <a:p>
-            <a:r>
-              <a:rPr lang="en-US" sz="2800" smtClean="0"/>
-              <a:t>K-Means Clustering of words with PCA</a:t>
-            </a:r>
-            <a:endParaRPr lang="en-US" sz="2800" dirty="0"/>
-          </a:p>
-        </p:txBody>
-      </p:sp>
     </p:spTree>
     <p:extLst>
       <p:ext uri="{BB962C8B-B14F-4D97-AF65-F5344CB8AC3E}">
@@ -4552,8 +4575,17 @@
             </a:pPr>
             <a:r>
               <a:rPr lang="en-US" dirty="0" smtClean="0"/>
-              <a:t>	Eileen Blum					Roberto Hernandez</a:t>
-            </a:r>
+              <a:t>	Eileen Blum				</a:t>
+            </a:r>
+            <a:r>
+              <a:rPr lang="en-US" dirty="0" smtClean="0"/>
+              <a:t>Roberto Hernández </a:t>
+            </a:r>
+            <a:r>
+              <a:rPr lang="en-US" dirty="0" err="1" smtClean="0"/>
+              <a:t>Palomares</a:t>
+            </a:r>
+            <a:endParaRPr lang="en-US" dirty="0" smtClean="0"/>
           </a:p>
           <a:p>
             <a:pPr marL="0" indent="0">
@@ -4587,7 +4619,15 @@
             </a:r>
             <a:r>
               <a:rPr lang="en-US" dirty="0" smtClean="0"/>
-              <a:t>    Rutgers University			       The Ohio State University</a:t>
+              <a:t>    Rutgers University			 </a:t>
+            </a:r>
+            <a:r>
+              <a:rPr lang="en-US" dirty="0" smtClean="0"/>
+              <a:t>The </a:t>
+            </a:r>
+            <a:r>
+              <a:rPr lang="en-US" dirty="0" smtClean="0"/>
+              <a:t>Ohio State University</a:t>
             </a:r>
             <a:endParaRPr lang="en-US" dirty="0"/>
           </a:p>

</xml_diff>